<commit_message>
update for moose reports
</commit_message>
<xml_diff>
--- a/Nuclear_Fuel_Performance/NE533_Spring2022/MOOSE/MOOSE_project.pptx
+++ b/Nuclear_Fuel_Performance/NE533_Spring2022/MOOSE/MOOSE_project.pptx
@@ -302,7 +302,7 @@
             </a:pPr>
             <a:fld id="{D6F3A803-A045-354B-887A-01433CE46FC2}" type="datetime1">
               <a:rPr lang="en-US" smtClean="0"/>
-              <a:t>3/30/21</a:t>
+              <a:t>5/11/21</a:t>
             </a:fld>
             <a:endParaRPr lang="en-US"/>
           </a:p>
@@ -495,7 +495,7 @@
             </a:pPr>
             <a:fld id="{A8B33C1D-C2E2-1049-AA3F-CD6E91052752}" type="datetime1">
               <a:rPr lang="en-US" smtClean="0"/>
-              <a:t>3/30/21</a:t>
+              <a:t>5/11/21</a:t>
             </a:fld>
             <a:endParaRPr lang="en-US"/>
           </a:p>
@@ -697,7 +697,7 @@
             </a:pPr>
             <a:fld id="{2791AD68-B60C-4542-BDDD-2074DE6DE828}" type="datetime1">
               <a:rPr lang="en-US" smtClean="0"/>
-              <a:t>3/30/21</a:t>
+              <a:t>5/11/21</a:t>
             </a:fld>
             <a:endParaRPr lang="en-US"/>
           </a:p>
@@ -896,7 +896,7 @@
             </a:pPr>
             <a:fld id="{C5BD04BF-9DC2-6341-92B2-BD109A2EF3B1}" type="datetime1">
               <a:rPr lang="en-US" smtClean="0"/>
-              <a:t>3/30/21</a:t>
+              <a:t>5/11/21</a:t>
             </a:fld>
             <a:endParaRPr lang="en-US"/>
           </a:p>
@@ -1166,7 +1166,7 @@
             </a:pPr>
             <a:fld id="{FB0FFBC7-3028-644D-986B-D9855CB74B38}" type="datetime1">
               <a:rPr lang="en-US" smtClean="0"/>
-              <a:t>3/30/21</a:t>
+              <a:t>5/11/21</a:t>
             </a:fld>
             <a:endParaRPr lang="en-US"/>
           </a:p>
@@ -1477,7 +1477,7 @@
             </a:pPr>
             <a:fld id="{2C3B8AE4-01F5-CC42-9C62-61BC6528368B}" type="datetime1">
               <a:rPr lang="en-US" smtClean="0"/>
-              <a:t>3/30/21</a:t>
+              <a:t>5/11/21</a:t>
             </a:fld>
             <a:endParaRPr lang="en-US"/>
           </a:p>
@@ -1920,7 +1920,7 @@
             </a:pPr>
             <a:fld id="{77E49314-4A78-2444-9569-44EB70168344}" type="datetime1">
               <a:rPr lang="en-US" smtClean="0"/>
-              <a:t>3/30/21</a:t>
+              <a:t>5/11/21</a:t>
             </a:fld>
             <a:endParaRPr lang="en-US"/>
           </a:p>
@@ -2061,7 +2061,7 @@
             </a:pPr>
             <a:fld id="{5BC22837-4683-B242-B000-BCEE30621787}" type="datetime1">
               <a:rPr lang="en-US" smtClean="0"/>
-              <a:t>3/30/21</a:t>
+              <a:t>5/11/21</a:t>
             </a:fld>
             <a:endParaRPr lang="en-US"/>
           </a:p>
@@ -2180,7 +2180,7 @@
             </a:pPr>
             <a:fld id="{DCDAE926-7EF1-0B40-B57E-417D188A609C}" type="datetime1">
               <a:rPr lang="en-US" smtClean="0"/>
-              <a:t>3/30/21</a:t>
+              <a:t>5/11/21</a:t>
             </a:fld>
             <a:endParaRPr lang="en-US"/>
           </a:p>
@@ -2479,7 +2479,7 @@
             </a:pPr>
             <a:fld id="{518D107B-B9C7-5B41-A168-55258AB95F52}" type="datetime1">
               <a:rPr lang="en-US" smtClean="0"/>
-              <a:t>3/30/21</a:t>
+              <a:t>5/11/21</a:t>
             </a:fld>
             <a:endParaRPr lang="en-US"/>
           </a:p>
@@ -2763,7 +2763,7 @@
             </a:pPr>
             <a:fld id="{3AD92D36-EE82-3142-B011-9831FB5E702F}" type="datetime1">
               <a:rPr lang="en-US" smtClean="0"/>
-              <a:t>3/30/21</a:t>
+              <a:t>5/11/21</a:t>
             </a:fld>
             <a:endParaRPr lang="en-US"/>
           </a:p>
@@ -2904,7 +2904,7 @@
               </a14:hiddenLine>
             </a:ext>
             <a:ext uri="{FAA26D3D-D897-4be2-8F04-BA451C77F1D7}">
-              <ma14:placeholderFlag xmlns:ma14="http://schemas.microsoft.com/office/mac/drawingml/2011/main" xmlns="" val="1"/>
+              <ma14:placeholderFlag xmlns="" xmlns:ma14="http://schemas.microsoft.com/office/mac/drawingml/2011/main" val="1"/>
             </a:ext>
           </a:extLst>
         </p:spPr>
@@ -2972,7 +2972,7 @@
               </a14:hiddenLine>
             </a:ext>
             <a:ext uri="{FAA26D3D-D897-4be2-8F04-BA451C77F1D7}">
-              <ma14:placeholderFlag xmlns:ma14="http://schemas.microsoft.com/office/mac/drawingml/2011/main" xmlns="" val="1"/>
+              <ma14:placeholderFlag xmlns="" xmlns:ma14="http://schemas.microsoft.com/office/mac/drawingml/2011/main" val="1"/>
             </a:ext>
           </a:extLst>
         </p:spPr>
@@ -3068,7 +3068,7 @@
             </a:pPr>
             <a:fld id="{3EE08B4B-7256-494F-A90D-3891BD685F4A}" type="datetime1">
               <a:rPr lang="en-US" smtClean="0"/>
-              <a:t>3/30/21</a:t>
+              <a:t>5/11/21</a:t>
             </a:fld>
             <a:endParaRPr lang="en-US" dirty="0"/>
           </a:p>
@@ -4168,7 +4168,7 @@
         <p:spPr>
           <a:xfrm>
             <a:off x="667872" y="1968501"/>
-            <a:ext cx="5257797" cy="3970318"/>
+            <a:ext cx="5257797" cy="4801314"/>
           </a:xfrm>
           <a:prstGeom prst="rect">
             <a:avLst/>
@@ -4180,6 +4180,100 @@
             <a:spAutoFit/>
           </a:bodyPr>
           <a:lstStyle/>
+          <a:p>
+            <a:pPr marL="285750" marR="0" lvl="0" indent="-285750" algn="l" defTabSz="914400" rtl="0" eaLnBrk="1" fontAlgn="auto" latinLnBrk="0" hangingPunct="1">
+              <a:lnSpc>
+                <a:spcPct val="100000"/>
+              </a:lnSpc>
+              <a:spcBef>
+                <a:spcPts val="0"/>
+              </a:spcBef>
+              <a:spcAft>
+                <a:spcPts val="0"/>
+              </a:spcAft>
+              <a:buClrTx/>
+              <a:buSzTx/>
+              <a:buFont typeface="Arial" panose="020B0604020202020204" pitchFamily="34" charset="0"/>
+              <a:buChar char="•"/>
+              <a:tabLst/>
+              <a:defRPr/>
+            </a:pPr>
+            <a:r>
+              <a:rPr kumimoji="0" lang="en-US" sz="1800" b="0" i="0" u="none" strike="noStrike" kern="1200" cap="none" spc="0" normalizeH="0" baseline="0" noProof="0" dirty="0">
+                <a:ln>
+                  <a:noFill/>
+                </a:ln>
+                <a:solidFill>
+                  <a:prstClr val="black"/>
+                </a:solidFill>
+                <a:effectLst/>
+                <a:uLnTx/>
+                <a:uFillTx/>
+                <a:latin typeface="Calibri"/>
+                <a:ea typeface="+mn-ea"/>
+                <a:cs typeface="+mn-cs"/>
+              </a:rPr>
+              <a:t>CHANGE THIS TO LHR</a:t>
+            </a:r>
+          </a:p>
+          <a:p>
+            <a:pPr marL="285750" marR="0" lvl="0" indent="-285750" algn="l" defTabSz="914400" rtl="0" eaLnBrk="1" fontAlgn="auto" latinLnBrk="0" hangingPunct="1">
+              <a:lnSpc>
+                <a:spcPct val="100000"/>
+              </a:lnSpc>
+              <a:spcBef>
+                <a:spcPts val="0"/>
+              </a:spcBef>
+              <a:spcAft>
+                <a:spcPts val="0"/>
+              </a:spcAft>
+              <a:buClrTx/>
+              <a:buSzTx/>
+              <a:buFont typeface="Arial" panose="020B0604020202020204" pitchFamily="34" charset="0"/>
+              <a:buChar char="•"/>
+              <a:tabLst/>
+              <a:defRPr/>
+            </a:pPr>
+            <a:endParaRPr lang="en-US" dirty="0">
+              <a:solidFill>
+                <a:prstClr val="black"/>
+              </a:solidFill>
+              <a:latin typeface="Calibri"/>
+            </a:endParaRPr>
+          </a:p>
+          <a:p>
+            <a:pPr marL="285750" marR="0" lvl="0" indent="-285750" algn="l" defTabSz="914400" rtl="0" eaLnBrk="1" fontAlgn="auto" latinLnBrk="0" hangingPunct="1">
+              <a:lnSpc>
+                <a:spcPct val="100000"/>
+              </a:lnSpc>
+              <a:spcBef>
+                <a:spcPts val="0"/>
+              </a:spcBef>
+              <a:spcAft>
+                <a:spcPts val="0"/>
+              </a:spcAft>
+              <a:buClrTx/>
+              <a:buSzTx/>
+              <a:buFont typeface="Arial" panose="020B0604020202020204" pitchFamily="34" charset="0"/>
+              <a:buChar char="•"/>
+              <a:tabLst/>
+              <a:defRPr/>
+            </a:pPr>
+            <a:endParaRPr kumimoji="0" lang="en-US" sz="1800" b="0" i="0" u="none" strike="noStrike" kern="1200" cap="none" spc="0" normalizeH="0" baseline="0" noProof="0" dirty="0">
+              <a:ln>
+                <a:noFill/>
+              </a:ln>
+              <a:solidFill>
+                <a:prstClr val="black"/>
+              </a:solidFill>
+              <a:effectLst/>
+              <a:uLnTx/>
+              <a:uFillTx/>
+              <a:latin typeface="Calibri"/>
+              <a:ea typeface="+mn-ea"/>
+              <a:cs typeface="+mn-cs"/>
+            </a:endParaRPr>
+          </a:p>
           <a:p>
             <a:pPr marL="285750" marR="0" lvl="0" indent="-285750" algn="l" defTabSz="914400" rtl="0" eaLnBrk="1" fontAlgn="auto" latinLnBrk="0" hangingPunct="1">
               <a:lnSpc>
@@ -4456,7 +4550,7 @@
                 <a:ea typeface="+mn-ea"/>
                 <a:cs typeface="+mn-cs"/>
               </a:rPr>
-              <a:t>Steady-state: Volumetric/Areal heating rate: </a:t>
+              <a:t>Steady-state: Volumetric heating rate: </a:t>
             </a:r>
           </a:p>
           <a:p>
@@ -4588,7 +4682,41 @@
                 <a:ea typeface="+mn-ea"/>
                 <a:cs typeface="+mn-cs"/>
               </a:rPr>
-              <a:t>Transient: Volumetric/Areal heating rate</a:t>
+              <a:t>Transient: </a:t>
+            </a:r>
+            <a:r>
+              <a:rPr kumimoji="0" lang="en-US" sz="1800" b="0" i="0" u="none" strike="noStrike" kern="1200" cap="none" spc="0" normalizeH="0" baseline="0" noProof="0" dirty="0" err="1">
+                <a:ln>
+                  <a:noFill/>
+                </a:ln>
+                <a:solidFill>
+                  <a:prstClr val="black"/>
+                </a:solidFill>
+                <a:effectLst/>
+                <a:uLnTx/>
+                <a:uFillTx/>
+                <a:latin typeface="Calibri"/>
+                <a:ea typeface="+mn-ea"/>
+                <a:cs typeface="+mn-cs"/>
+              </a:rPr>
+              <a:t>Volumetricheating</a:t>
+            </a:r>
+            <a:r>
+              <a:rPr kumimoji="0" lang="en-US" sz="1800" b="0" i="0" u="none" strike="noStrike" kern="1200" cap="none" spc="0" normalizeH="0" baseline="0" noProof="0" dirty="0">
+                <a:ln>
+                  <a:noFill/>
+                </a:ln>
+                <a:solidFill>
+                  <a:prstClr val="black"/>
+                </a:solidFill>
+                <a:effectLst/>
+                <a:uLnTx/>
+                <a:uFillTx/>
+                <a:latin typeface="Calibri"/>
+                <a:ea typeface="+mn-ea"/>
+                <a:cs typeface="+mn-cs"/>
+              </a:rPr>
+              <a:t> rate</a:t>
             </a:r>
             <a:endParaRPr lang="en-US" dirty="0">
               <a:solidFill>
@@ -5673,7 +5801,7 @@
         <p:spPr>
           <a:xfrm>
             <a:off x="667872" y="1968501"/>
-            <a:ext cx="7412249" cy="3970318"/>
+            <a:ext cx="7412249" cy="4524315"/>
           </a:xfrm>
           <a:prstGeom prst="rect">
             <a:avLst/>
@@ -5685,6 +5813,67 @@
             <a:spAutoFit/>
           </a:bodyPr>
           <a:lstStyle/>
+          <a:p>
+            <a:pPr marL="285750" marR="0" lvl="0" indent="-285750" algn="l" defTabSz="914400" rtl="0" eaLnBrk="1" fontAlgn="auto" latinLnBrk="0" hangingPunct="1">
+              <a:lnSpc>
+                <a:spcPct val="100000"/>
+              </a:lnSpc>
+              <a:spcBef>
+                <a:spcPts val="0"/>
+              </a:spcBef>
+              <a:spcAft>
+                <a:spcPts val="0"/>
+              </a:spcAft>
+              <a:buClrTx/>
+              <a:buSzTx/>
+              <a:buFont typeface="Arial" panose="020B0604020202020204" pitchFamily="34" charset="0"/>
+              <a:buChar char="•"/>
+              <a:tabLst/>
+              <a:defRPr/>
+            </a:pPr>
+            <a:r>
+              <a:rPr kumimoji="0" lang="en-US" sz="1800" b="0" i="0" u="none" strike="noStrike" kern="1200" cap="none" spc="0" normalizeH="0" baseline="0" noProof="0" dirty="0">
+                <a:ln>
+                  <a:noFill/>
+                </a:ln>
+                <a:solidFill>
+                  <a:prstClr val="black"/>
+                </a:solidFill>
+                <a:effectLst/>
+                <a:uLnTx/>
+                <a:uFillTx/>
+                <a:latin typeface="Calibri"/>
+                <a:ea typeface="+mn-ea"/>
+                <a:cs typeface="+mn-cs"/>
+              </a:rPr>
+              <a:t>CHANGE THIS TO LHR</a:t>
+            </a:r>
+          </a:p>
+          <a:p>
+            <a:pPr marL="285750" marR="0" lvl="0" indent="-285750" algn="l" defTabSz="914400" rtl="0" eaLnBrk="1" fontAlgn="auto" latinLnBrk="0" hangingPunct="1">
+              <a:lnSpc>
+                <a:spcPct val="100000"/>
+              </a:lnSpc>
+              <a:spcBef>
+                <a:spcPts val="0"/>
+              </a:spcBef>
+              <a:spcAft>
+                <a:spcPts val="0"/>
+              </a:spcAft>
+              <a:buClrTx/>
+              <a:buSzTx/>
+              <a:buFont typeface="Arial" panose="020B0604020202020204" pitchFamily="34" charset="0"/>
+              <a:buChar char="•"/>
+              <a:tabLst/>
+              <a:defRPr/>
+            </a:pPr>
+            <a:endParaRPr lang="en-US" dirty="0">
+              <a:solidFill>
+                <a:prstClr val="black"/>
+              </a:solidFill>
+              <a:latin typeface="Calibri"/>
+            </a:endParaRPr>
+          </a:p>
           <a:p>
             <a:pPr marL="285750" marR="0" lvl="0" indent="-285750" algn="l" defTabSz="914400" rtl="0" eaLnBrk="1" fontAlgn="auto" latinLnBrk="0" hangingPunct="1">
               <a:lnSpc>
@@ -5784,41 +5973,7 @@
                 <a:ea typeface="+mn-ea"/>
                 <a:cs typeface="+mn-cs"/>
               </a:rPr>
-              <a:t>Utilize </a:t>
-            </a:r>
-            <a:r>
-              <a:rPr kumimoji="0" lang="en-US" sz="1800" b="0" i="0" u="none" strike="noStrike" kern="1200" cap="none" spc="0" normalizeH="0" baseline="0" noProof="0" dirty="0" err="1">
-                <a:ln>
-                  <a:noFill/>
-                </a:ln>
-                <a:solidFill>
-                  <a:prstClr val="black"/>
-                </a:solidFill>
-                <a:effectLst/>
-                <a:uLnTx/>
-                <a:uFillTx/>
-                <a:latin typeface="Calibri"/>
-                <a:ea typeface="+mn-ea"/>
-                <a:cs typeface="+mn-cs"/>
-              </a:rPr>
-              <a:t>azial</a:t>
-            </a:r>
-            <a:r>
-              <a:rPr kumimoji="0" lang="en-US" sz="1800" b="0" i="0" u="none" strike="noStrike" kern="1200" cap="none" spc="0" normalizeH="0" baseline="0" noProof="0" dirty="0">
-                <a:ln>
-                  <a:noFill/>
-                </a:ln>
-                <a:solidFill>
-                  <a:prstClr val="black"/>
-                </a:solidFill>
-                <a:effectLst/>
-                <a:uLnTx/>
-                <a:uFillTx/>
-                <a:latin typeface="Calibri"/>
-                <a:ea typeface="+mn-ea"/>
-                <a:cs typeface="+mn-cs"/>
-              </a:rPr>
-              <a:t> T</a:t>
+              <a:t>Utilize axial T</a:t>
             </a:r>
             <a:r>
               <a:rPr kumimoji="0" lang="en-US" sz="1800" b="0" i="0" u="none" strike="noStrike" kern="1200" cap="none" spc="0" normalizeH="0" baseline="-25000" noProof="0" dirty="0">

</xml_diff>